<commit_message>
Updated presentation for lab 03_MVVM.
</commit_message>
<xml_diff>
--- a/03_MVVM/PV239-Xamarin-03_MVVM.pptx
+++ b/03_MVVM/PV239-Xamarin-03_MVVM.pptx
@@ -215,7 +215,7 @@
           <a:p>
             <a:fld id="{48A795E8-66B5-4696-B483-F1F9FA0B53D4}" type="datetimeFigureOut">
               <a:rPr lang="cs-CZ" smtClean="0"/>
-              <a:t>10.03.2019</a:t>
+              <a:t>12.01.2020</a:t>
             </a:fld>
             <a:endParaRPr lang="cs-CZ"/>
           </a:p>
@@ -9420,7 +9420,7 @@
           <a:p>
             <a:fld id="{4AAD347D-5ACD-4C99-B74B-A9C85AD731AF}" type="datetimeFigureOut">
               <a:rPr lang="en-US" smtClean="0"/>
-              <a:t>2019-03-10</a:t>
+              <a:t>1/12/2020</a:t>
             </a:fld>
             <a:endParaRPr lang="en-US" dirty="0"/>
           </a:p>
@@ -9627,7 +9627,7 @@
           <a:p>
             <a:fld id="{4509A250-FF31-4206-8172-F9D3106AACB1}" type="datetimeFigureOut">
               <a:rPr lang="en-US" smtClean="0"/>
-              <a:t>2019-03-10</a:t>
+              <a:t>1/12/2020</a:t>
             </a:fld>
             <a:endParaRPr lang="en-US" dirty="0"/>
           </a:p>
@@ -9807,7 +9807,7 @@
           <a:p>
             <a:fld id="{4509A250-FF31-4206-8172-F9D3106AACB1}" type="datetimeFigureOut">
               <a:rPr lang="en-US" smtClean="0"/>
-              <a:t>2019-03-10</a:t>
+              <a:t>1/12/2020</a:t>
             </a:fld>
             <a:endParaRPr lang="en-US" dirty="0"/>
           </a:p>
@@ -10012,7 +10012,7 @@
           <a:p>
             <a:fld id="{4509A250-FF31-4206-8172-F9D3106AACB1}" type="datetimeFigureOut">
               <a:rPr lang="en-US" smtClean="0"/>
-              <a:t>2019-03-10</a:t>
+              <a:t>1/12/2020</a:t>
             </a:fld>
             <a:endParaRPr lang="en-US" dirty="0"/>
           </a:p>
@@ -18910,7 +18910,7 @@
           <a:p>
             <a:fld id="{9796027F-7875-4030-9381-8BD8C4F21935}" type="datetimeFigureOut">
               <a:rPr lang="en-US" smtClean="0"/>
-              <a:t>2019-03-10</a:t>
+              <a:t>1/12/2020</a:t>
             </a:fld>
             <a:endParaRPr lang="en-US" dirty="0"/>
           </a:p>
@@ -19184,7 +19184,7 @@
           <a:p>
             <a:fld id="{9796027F-7875-4030-9381-8BD8C4F21935}" type="datetimeFigureOut">
               <a:rPr lang="en-US" smtClean="0"/>
-              <a:t>2019-03-10</a:t>
+              <a:t>1/12/2020</a:t>
             </a:fld>
             <a:endParaRPr lang="en-US" dirty="0"/>
           </a:p>
@@ -19582,7 +19582,7 @@
           <a:p>
             <a:fld id="{9796027F-7875-4030-9381-8BD8C4F21935}" type="datetimeFigureOut">
               <a:rPr lang="en-US" smtClean="0"/>
-              <a:t>2019-03-10</a:t>
+              <a:t>1/12/2020</a:t>
             </a:fld>
             <a:endParaRPr lang="en-US" dirty="0"/>
           </a:p>
@@ -19700,7 +19700,7 @@
           <a:p>
             <a:fld id="{4509A250-FF31-4206-8172-F9D3106AACB1}" type="datetimeFigureOut">
               <a:rPr lang="en-US" smtClean="0"/>
-              <a:t>2019-03-10</a:t>
+              <a:t>1/12/2020</a:t>
             </a:fld>
             <a:endParaRPr lang="en-US" dirty="0"/>
           </a:p>
@@ -19795,7 +19795,7 @@
           <a:p>
             <a:fld id="{4509A250-FF31-4206-8172-F9D3106AACB1}" type="datetimeFigureOut">
               <a:rPr lang="en-US" smtClean="0"/>
-              <a:t>2019-03-10</a:t>
+              <a:t>1/12/2020</a:t>
             </a:fld>
             <a:endParaRPr lang="en-US" dirty="0"/>
           </a:p>
@@ -20085,7 +20085,7 @@
           <a:p>
             <a:fld id="{4509A250-FF31-4206-8172-F9D3106AACB1}" type="datetimeFigureOut">
               <a:rPr lang="en-US" smtClean="0"/>
-              <a:t>2019-03-10</a:t>
+              <a:t>1/12/2020</a:t>
             </a:fld>
             <a:endParaRPr lang="en-US" dirty="0"/>
           </a:p>
@@ -20365,7 +20365,7 @@
           <a:p>
             <a:fld id="{4509A250-FF31-4206-8172-F9D3106AACB1}" type="datetimeFigureOut">
               <a:rPr lang="en-US" smtClean="0"/>
-              <a:t>2019-03-10</a:t>
+              <a:t>1/12/2020</a:t>
             </a:fld>
             <a:endParaRPr lang="en-US" dirty="0"/>
           </a:p>
@@ -20615,7 +20615,7 @@
           <a:p>
             <a:fld id="{4AAD347D-5ACD-4C99-B74B-A9C85AD731AF}" type="datetimeFigureOut">
               <a:rPr lang="en-US" smtClean="0"/>
-              <a:t>2019-03-10</a:t>
+              <a:t>1/12/2020</a:t>
             </a:fld>
             <a:endParaRPr lang="en-US" dirty="0"/>
           </a:p>
@@ -29703,7 +29703,7 @@
         <p:spPr/>
         <p:txBody>
           <a:bodyPr>
-            <a:normAutofit lnSpcReduction="10000"/>
+            <a:normAutofit/>
           </a:bodyPr>
           <a:lstStyle/>
           <a:p>
@@ -29925,33 +29925,6 @@
               </a:rPr>
               <a:t>:</a:t>
             </a:r>
-          </a:p>
-          <a:p>
-            <a:pPr lvl="1"/>
-            <a:r>
-              <a:rPr lang="cs-CZ" sz="2000" dirty="0">
-                <a:solidFill>
-                  <a:srgbClr val="000000"/>
-                </a:solidFill>
-                <a:latin typeface="Consolas" panose="020B0609020204030204" pitchFamily="49" charset="0"/>
-              </a:rPr>
-              <a:t>Nuget balíček </a:t>
-            </a:r>
-            <a:r>
-              <a:rPr lang="cs-CZ" sz="2000" dirty="0" err="1">
-                <a:solidFill>
-                  <a:srgbClr val="000000"/>
-                </a:solidFill>
-                <a:latin typeface="Consolas" panose="020B0609020204030204" pitchFamily="49" charset="0"/>
-              </a:rPr>
-              <a:t>Fody</a:t>
-            </a:r>
-            <a:endParaRPr lang="cs-CZ" sz="2000" dirty="0">
-              <a:solidFill>
-                <a:srgbClr val="000000"/>
-              </a:solidFill>
-              <a:latin typeface="Consolas" panose="020B0609020204030204" pitchFamily="49" charset="0"/>
-            </a:endParaRPr>
           </a:p>
           <a:p>
             <a:pPr lvl="1"/>
@@ -30304,37 +30277,6 @@
                                           <p:spTgt spid="3">
                                             <p:txEl>
                                               <p:pRg st="9" end="9"/>
-                                            </p:txEl>
-                                          </p:spTgt>
-                                        </p:tgtEl>
-                                        <p:attrNameLst>
-                                          <p:attrName>style.visibility</p:attrName>
-                                        </p:attrNameLst>
-                                      </p:cBhvr>
-                                      <p:to>
-                                        <p:strVal val="visible"/>
-                                      </p:to>
-                                    </p:set>
-                                  </p:childTnLst>
-                                </p:cTn>
-                              </p:par>
-                              <p:par>
-                                <p:cTn id="27" presetID="1" presetClass="entr" presetSubtype="0" fill="hold" grpId="0" nodeType="withEffect">
-                                  <p:stCondLst>
-                                    <p:cond delay="0"/>
-                                  </p:stCondLst>
-                                  <p:childTnLst>
-                                    <p:set>
-                                      <p:cBhvr>
-                                        <p:cTn id="28" dur="1" fill="hold">
-                                          <p:stCondLst>
-                                            <p:cond delay="0"/>
-                                          </p:stCondLst>
-                                        </p:cTn>
-                                        <p:tgtEl>
-                                          <p:spTgt spid="3">
-                                            <p:txEl>
-                                              <p:pRg st="10" end="10"/>
                                             </p:txEl>
                                           </p:spTgt>
                                         </p:tgtEl>

</xml_diff>

<commit_message>
Updated presentation for lab 03.
</commit_message>
<xml_diff>
--- a/03_MVVM/PV239-Xamarin-03_MVVM.pptx
+++ b/03_MVVM/PV239-Xamarin-03_MVVM.pptx
@@ -5,28 +5,30 @@
     <p:sldMasterId id="2147483700" r:id="rId1"/>
   </p:sldMasterIdLst>
   <p:notesMasterIdLst>
-    <p:notesMasterId r:id="rId21"/>
+    <p:notesMasterId r:id="rId23"/>
   </p:notesMasterIdLst>
   <p:sldIdLst>
     <p:sldId id="256" r:id="rId2"/>
-    <p:sldId id="361" r:id="rId3"/>
-    <p:sldId id="327" r:id="rId4"/>
-    <p:sldId id="370" r:id="rId5"/>
-    <p:sldId id="289" r:id="rId6"/>
-    <p:sldId id="287" r:id="rId7"/>
-    <p:sldId id="288" r:id="rId8"/>
-    <p:sldId id="290" r:id="rId9"/>
-    <p:sldId id="296" r:id="rId10"/>
-    <p:sldId id="315" r:id="rId11"/>
-    <p:sldId id="328" r:id="rId12"/>
-    <p:sldId id="332" r:id="rId13"/>
-    <p:sldId id="363" r:id="rId14"/>
-    <p:sldId id="364" r:id="rId15"/>
-    <p:sldId id="365" r:id="rId16"/>
-    <p:sldId id="366" r:id="rId17"/>
-    <p:sldId id="367" r:id="rId18"/>
-    <p:sldId id="368" r:id="rId19"/>
-    <p:sldId id="369" r:id="rId20"/>
+    <p:sldId id="371" r:id="rId3"/>
+    <p:sldId id="361" r:id="rId4"/>
+    <p:sldId id="327" r:id="rId5"/>
+    <p:sldId id="370" r:id="rId6"/>
+    <p:sldId id="289" r:id="rId7"/>
+    <p:sldId id="287" r:id="rId8"/>
+    <p:sldId id="288" r:id="rId9"/>
+    <p:sldId id="290" r:id="rId10"/>
+    <p:sldId id="296" r:id="rId11"/>
+    <p:sldId id="315" r:id="rId12"/>
+    <p:sldId id="328" r:id="rId13"/>
+    <p:sldId id="332" r:id="rId14"/>
+    <p:sldId id="363" r:id="rId15"/>
+    <p:sldId id="364" r:id="rId16"/>
+    <p:sldId id="365" r:id="rId17"/>
+    <p:sldId id="366" r:id="rId18"/>
+    <p:sldId id="367" r:id="rId19"/>
+    <p:sldId id="368" r:id="rId20"/>
+    <p:sldId id="369" r:id="rId21"/>
+    <p:sldId id="372" r:id="rId22"/>
   </p:sldIdLst>
   <p:sldSz cx="12192000" cy="6858000"/>
   <p:notesSz cx="6858000" cy="9144000"/>
@@ -215,7 +217,7 @@
           <a:p>
             <a:fld id="{48A795E8-66B5-4696-B483-F1F9FA0B53D4}" type="datetimeFigureOut">
               <a:rPr lang="cs-CZ" smtClean="0"/>
-              <a:t>12.01.2020</a:t>
+              <a:t>04.03.2020</a:t>
             </a:fld>
             <a:endParaRPr lang="cs-CZ"/>
           </a:p>
@@ -608,7 +610,7 @@
           <a:p>
             <a:fld id="{963D3E91-CF0B-41E6-A2F9-9C119AD99D05}" type="slidenum">
               <a:rPr lang="cs-CZ" smtClean="0"/>
-              <a:t>3</a:t>
+              <a:t>4</a:t>
             </a:fld>
             <a:endParaRPr lang="cs-CZ"/>
           </a:p>
@@ -9420,7 +9422,7 @@
           <a:p>
             <a:fld id="{4AAD347D-5ACD-4C99-B74B-A9C85AD731AF}" type="datetimeFigureOut">
               <a:rPr lang="en-US" smtClean="0"/>
-              <a:t>1/12/2020</a:t>
+              <a:t>3/4/2020</a:t>
             </a:fld>
             <a:endParaRPr lang="en-US" dirty="0"/>
           </a:p>
@@ -9627,7 +9629,7 @@
           <a:p>
             <a:fld id="{4509A250-FF31-4206-8172-F9D3106AACB1}" type="datetimeFigureOut">
               <a:rPr lang="en-US" smtClean="0"/>
-              <a:t>1/12/2020</a:t>
+              <a:t>3/4/2020</a:t>
             </a:fld>
             <a:endParaRPr lang="en-US" dirty="0"/>
           </a:p>
@@ -9807,7 +9809,7 @@
           <a:p>
             <a:fld id="{4509A250-FF31-4206-8172-F9D3106AACB1}" type="datetimeFigureOut">
               <a:rPr lang="en-US" smtClean="0"/>
-              <a:t>1/12/2020</a:t>
+              <a:t>3/4/2020</a:t>
             </a:fld>
             <a:endParaRPr lang="en-US" dirty="0"/>
           </a:p>
@@ -10012,7 +10014,7 @@
           <a:p>
             <a:fld id="{4509A250-FF31-4206-8172-F9D3106AACB1}" type="datetimeFigureOut">
               <a:rPr lang="en-US" smtClean="0"/>
-              <a:t>1/12/2020</a:t>
+              <a:t>3/4/2020</a:t>
             </a:fld>
             <a:endParaRPr lang="en-US" dirty="0"/>
           </a:p>
@@ -18910,7 +18912,7 @@
           <a:p>
             <a:fld id="{9796027F-7875-4030-9381-8BD8C4F21935}" type="datetimeFigureOut">
               <a:rPr lang="en-US" smtClean="0"/>
-              <a:t>1/12/2020</a:t>
+              <a:t>3/4/2020</a:t>
             </a:fld>
             <a:endParaRPr lang="en-US" dirty="0"/>
           </a:p>
@@ -19184,7 +19186,7 @@
           <a:p>
             <a:fld id="{9796027F-7875-4030-9381-8BD8C4F21935}" type="datetimeFigureOut">
               <a:rPr lang="en-US" smtClean="0"/>
-              <a:t>1/12/2020</a:t>
+              <a:t>3/4/2020</a:t>
             </a:fld>
             <a:endParaRPr lang="en-US" dirty="0"/>
           </a:p>
@@ -19582,7 +19584,7 @@
           <a:p>
             <a:fld id="{9796027F-7875-4030-9381-8BD8C4F21935}" type="datetimeFigureOut">
               <a:rPr lang="en-US" smtClean="0"/>
-              <a:t>1/12/2020</a:t>
+              <a:t>3/4/2020</a:t>
             </a:fld>
             <a:endParaRPr lang="en-US" dirty="0"/>
           </a:p>
@@ -19700,7 +19702,7 @@
           <a:p>
             <a:fld id="{4509A250-FF31-4206-8172-F9D3106AACB1}" type="datetimeFigureOut">
               <a:rPr lang="en-US" smtClean="0"/>
-              <a:t>1/12/2020</a:t>
+              <a:t>3/4/2020</a:t>
             </a:fld>
             <a:endParaRPr lang="en-US" dirty="0"/>
           </a:p>
@@ -19795,7 +19797,7 @@
           <a:p>
             <a:fld id="{4509A250-FF31-4206-8172-F9D3106AACB1}" type="datetimeFigureOut">
               <a:rPr lang="en-US" smtClean="0"/>
-              <a:t>1/12/2020</a:t>
+              <a:t>3/4/2020</a:t>
             </a:fld>
             <a:endParaRPr lang="en-US" dirty="0"/>
           </a:p>
@@ -20085,7 +20087,7 @@
           <a:p>
             <a:fld id="{4509A250-FF31-4206-8172-F9D3106AACB1}" type="datetimeFigureOut">
               <a:rPr lang="en-US" smtClean="0"/>
-              <a:t>1/12/2020</a:t>
+              <a:t>3/4/2020</a:t>
             </a:fld>
             <a:endParaRPr lang="en-US" dirty="0"/>
           </a:p>
@@ -20365,7 +20367,7 @@
           <a:p>
             <a:fld id="{4509A250-FF31-4206-8172-F9D3106AACB1}" type="datetimeFigureOut">
               <a:rPr lang="en-US" smtClean="0"/>
-              <a:t>1/12/2020</a:t>
+              <a:t>3/4/2020</a:t>
             </a:fld>
             <a:endParaRPr lang="en-US" dirty="0"/>
           </a:p>
@@ -20615,7 +20617,7 @@
           <a:p>
             <a:fld id="{4AAD347D-5ACD-4C99-B74B-A9C85AD731AF}" type="datetimeFigureOut">
               <a:rPr lang="en-US" smtClean="0"/>
-              <a:t>1/12/2020</a:t>
+              <a:t>3/4/2020</a:t>
             </a:fld>
             <a:endParaRPr lang="en-US" dirty="0"/>
           </a:p>
@@ -21434,6 +21436,413 @@
       </p:grpSpPr>
       <p:sp>
         <p:nvSpPr>
+          <p:cNvPr id="2" name="Nadpis 1"/>
+          <p:cNvSpPr>
+            <a:spLocks noGrp="1"/>
+          </p:cNvSpPr>
+          <p:nvPr>
+            <p:ph type="title"/>
+          </p:nvPr>
+        </p:nvSpPr>
+        <p:spPr/>
+        <p:txBody>
+          <a:bodyPr/>
+          <a:lstStyle/>
+          <a:p>
+            <a:r>
+              <a:rPr lang="cs-CZ" dirty="0" err="1"/>
+              <a:t>INotifyCollectionChanged</a:t>
+            </a:r>
+            <a:endParaRPr lang="sk-SK" dirty="0"/>
+          </a:p>
+        </p:txBody>
+      </p:sp>
+      <p:sp>
+        <p:nvSpPr>
+          <p:cNvPr id="3" name="Zástupný symbol pro obsah 2"/>
+          <p:cNvSpPr>
+            <a:spLocks noGrp="1"/>
+          </p:cNvSpPr>
+          <p:nvPr>
+            <p:ph idx="1"/>
+          </p:nvPr>
+        </p:nvSpPr>
+        <p:spPr/>
+        <p:txBody>
+          <a:bodyPr/>
+          <a:lstStyle/>
+          <a:p>
+            <a:r>
+              <a:rPr lang="cs-CZ" b="1" dirty="0" err="1"/>
+              <a:t>ObservableCollection</a:t>
+            </a:r>
+            <a:r>
+              <a:rPr lang="cs-CZ" b="1" dirty="0"/>
+              <a:t>&lt;T&gt;</a:t>
+            </a:r>
+          </a:p>
+          <a:p>
+            <a:pPr lvl="1"/>
+            <a:r>
+              <a:rPr lang="cs-CZ" dirty="0"/>
+              <a:t>implementuje toto rozhraní</a:t>
+            </a:r>
+          </a:p>
+          <a:p>
+            <a:pPr lvl="1"/>
+            <a:endParaRPr lang="cs-CZ" dirty="0"/>
+          </a:p>
+          <a:p>
+            <a:r>
+              <a:rPr lang="cs-CZ" dirty="0"/>
+              <a:t>Vlastní kolekce</a:t>
+            </a:r>
+          </a:p>
+          <a:p>
+            <a:pPr lvl="1"/>
+            <a:r>
+              <a:rPr lang="cs-CZ" dirty="0"/>
+              <a:t>podporu přidáme</a:t>
+            </a:r>
+          </a:p>
+          <a:p>
+            <a:endParaRPr lang="cs-CZ" dirty="0"/>
+          </a:p>
+          <a:p>
+            <a:r>
+              <a:rPr lang="cs-CZ" dirty="0"/>
+              <a:t>Existující kolekce</a:t>
+            </a:r>
+          </a:p>
+          <a:p>
+            <a:pPr lvl="1"/>
+            <a:r>
+              <a:rPr lang="cs-CZ" dirty="0"/>
+              <a:t>např. napsat kolem ní "</a:t>
+            </a:r>
+            <a:r>
+              <a:rPr lang="cs-CZ" dirty="0" err="1"/>
+              <a:t>wrapper</a:t>
+            </a:r>
+            <a:r>
+              <a:rPr lang="cs-CZ" dirty="0"/>
+              <a:t>"</a:t>
+            </a:r>
+          </a:p>
+          <a:p>
+            <a:pPr lvl="1"/>
+            <a:endParaRPr lang="cs-CZ" dirty="0"/>
+          </a:p>
+          <a:p>
+            <a:endParaRPr lang="sk-SK" dirty="0"/>
+          </a:p>
+        </p:txBody>
+      </p:sp>
+    </p:spTree>
+    <p:extLst>
+      <p:ext uri="{BB962C8B-B14F-4D97-AF65-F5344CB8AC3E}">
+        <p14:creationId xmlns:p14="http://schemas.microsoft.com/office/powerpoint/2010/main" val="3262396528"/>
+      </p:ext>
+    </p:extLst>
+  </p:cSld>
+  <p:clrMapOvr>
+    <a:masterClrMapping/>
+  </p:clrMapOvr>
+  <p:timing>
+    <p:tnLst>
+      <p:par>
+        <p:cTn id="1" dur="indefinite" restart="never" nodeType="tmRoot">
+          <p:childTnLst>
+            <p:seq concurrent="1" nextAc="seek">
+              <p:cTn id="2" dur="indefinite" nodeType="mainSeq">
+                <p:childTnLst>
+                  <p:par>
+                    <p:cTn id="3" fill="hold">
+                      <p:stCondLst>
+                        <p:cond delay="indefinite"/>
+                      </p:stCondLst>
+                      <p:childTnLst>
+                        <p:par>
+                          <p:cTn id="4" fill="hold">
+                            <p:stCondLst>
+                              <p:cond delay="0"/>
+                            </p:stCondLst>
+                            <p:childTnLst>
+                              <p:par>
+                                <p:cTn id="5" presetID="1" presetClass="entr" presetSubtype="0" fill="hold" grpId="0" nodeType="clickEffect">
+                                  <p:stCondLst>
+                                    <p:cond delay="0"/>
+                                  </p:stCondLst>
+                                  <p:childTnLst>
+                                    <p:set>
+                                      <p:cBhvr>
+                                        <p:cTn id="6" dur="1" fill="hold">
+                                          <p:stCondLst>
+                                            <p:cond delay="0"/>
+                                          </p:stCondLst>
+                                        </p:cTn>
+                                        <p:tgtEl>
+                                          <p:spTgt spid="3">
+                                            <p:txEl>
+                                              <p:pRg st="0" end="0"/>
+                                            </p:txEl>
+                                          </p:spTgt>
+                                        </p:tgtEl>
+                                        <p:attrNameLst>
+                                          <p:attrName>style.visibility</p:attrName>
+                                        </p:attrNameLst>
+                                      </p:cBhvr>
+                                      <p:to>
+                                        <p:strVal val="visible"/>
+                                      </p:to>
+                                    </p:set>
+                                  </p:childTnLst>
+                                </p:cTn>
+                              </p:par>
+                              <p:par>
+                                <p:cTn id="7" presetID="1" presetClass="entr" presetSubtype="0" fill="hold" grpId="0" nodeType="withEffect">
+                                  <p:stCondLst>
+                                    <p:cond delay="0"/>
+                                  </p:stCondLst>
+                                  <p:childTnLst>
+                                    <p:set>
+                                      <p:cBhvr>
+                                        <p:cTn id="8" dur="1" fill="hold">
+                                          <p:stCondLst>
+                                            <p:cond delay="0"/>
+                                          </p:stCondLst>
+                                        </p:cTn>
+                                        <p:tgtEl>
+                                          <p:spTgt spid="3">
+                                            <p:txEl>
+                                              <p:pRg st="1" end="1"/>
+                                            </p:txEl>
+                                          </p:spTgt>
+                                        </p:tgtEl>
+                                        <p:attrNameLst>
+                                          <p:attrName>style.visibility</p:attrName>
+                                        </p:attrNameLst>
+                                      </p:cBhvr>
+                                      <p:to>
+                                        <p:strVal val="visible"/>
+                                      </p:to>
+                                    </p:set>
+                                  </p:childTnLst>
+                                </p:cTn>
+                              </p:par>
+                            </p:childTnLst>
+                          </p:cTn>
+                        </p:par>
+                      </p:childTnLst>
+                    </p:cTn>
+                  </p:par>
+                  <p:par>
+                    <p:cTn id="9" fill="hold">
+                      <p:stCondLst>
+                        <p:cond delay="indefinite"/>
+                      </p:stCondLst>
+                      <p:childTnLst>
+                        <p:par>
+                          <p:cTn id="10" fill="hold">
+                            <p:stCondLst>
+                              <p:cond delay="0"/>
+                            </p:stCondLst>
+                            <p:childTnLst>
+                              <p:par>
+                                <p:cTn id="11" presetID="1" presetClass="entr" presetSubtype="0" fill="hold" grpId="0" nodeType="clickEffect">
+                                  <p:stCondLst>
+                                    <p:cond delay="0"/>
+                                  </p:stCondLst>
+                                  <p:childTnLst>
+                                    <p:set>
+                                      <p:cBhvr>
+                                        <p:cTn id="12" dur="1" fill="hold">
+                                          <p:stCondLst>
+                                            <p:cond delay="0"/>
+                                          </p:stCondLst>
+                                        </p:cTn>
+                                        <p:tgtEl>
+                                          <p:spTgt spid="3">
+                                            <p:txEl>
+                                              <p:pRg st="3" end="3"/>
+                                            </p:txEl>
+                                          </p:spTgt>
+                                        </p:tgtEl>
+                                        <p:attrNameLst>
+                                          <p:attrName>style.visibility</p:attrName>
+                                        </p:attrNameLst>
+                                      </p:cBhvr>
+                                      <p:to>
+                                        <p:strVal val="visible"/>
+                                      </p:to>
+                                    </p:set>
+                                  </p:childTnLst>
+                                </p:cTn>
+                              </p:par>
+                              <p:par>
+                                <p:cTn id="13" presetID="1" presetClass="entr" presetSubtype="0" fill="hold" grpId="0" nodeType="withEffect">
+                                  <p:stCondLst>
+                                    <p:cond delay="0"/>
+                                  </p:stCondLst>
+                                  <p:childTnLst>
+                                    <p:set>
+                                      <p:cBhvr>
+                                        <p:cTn id="14" dur="1" fill="hold">
+                                          <p:stCondLst>
+                                            <p:cond delay="0"/>
+                                          </p:stCondLst>
+                                        </p:cTn>
+                                        <p:tgtEl>
+                                          <p:spTgt spid="3">
+                                            <p:txEl>
+                                              <p:pRg st="4" end="4"/>
+                                            </p:txEl>
+                                          </p:spTgt>
+                                        </p:tgtEl>
+                                        <p:attrNameLst>
+                                          <p:attrName>style.visibility</p:attrName>
+                                        </p:attrNameLst>
+                                      </p:cBhvr>
+                                      <p:to>
+                                        <p:strVal val="visible"/>
+                                      </p:to>
+                                    </p:set>
+                                  </p:childTnLst>
+                                </p:cTn>
+                              </p:par>
+                            </p:childTnLst>
+                          </p:cTn>
+                        </p:par>
+                      </p:childTnLst>
+                    </p:cTn>
+                  </p:par>
+                  <p:par>
+                    <p:cTn id="15" fill="hold">
+                      <p:stCondLst>
+                        <p:cond delay="indefinite"/>
+                      </p:stCondLst>
+                      <p:childTnLst>
+                        <p:par>
+                          <p:cTn id="16" fill="hold">
+                            <p:stCondLst>
+                              <p:cond delay="0"/>
+                            </p:stCondLst>
+                            <p:childTnLst>
+                              <p:par>
+                                <p:cTn id="17" presetID="1" presetClass="entr" presetSubtype="0" fill="hold" grpId="0" nodeType="clickEffect">
+                                  <p:stCondLst>
+                                    <p:cond delay="0"/>
+                                  </p:stCondLst>
+                                  <p:childTnLst>
+                                    <p:set>
+                                      <p:cBhvr>
+                                        <p:cTn id="18" dur="1" fill="hold">
+                                          <p:stCondLst>
+                                            <p:cond delay="0"/>
+                                          </p:stCondLst>
+                                        </p:cTn>
+                                        <p:tgtEl>
+                                          <p:spTgt spid="3">
+                                            <p:txEl>
+                                              <p:pRg st="6" end="6"/>
+                                            </p:txEl>
+                                          </p:spTgt>
+                                        </p:tgtEl>
+                                        <p:attrNameLst>
+                                          <p:attrName>style.visibility</p:attrName>
+                                        </p:attrNameLst>
+                                      </p:cBhvr>
+                                      <p:to>
+                                        <p:strVal val="visible"/>
+                                      </p:to>
+                                    </p:set>
+                                  </p:childTnLst>
+                                </p:cTn>
+                              </p:par>
+                              <p:par>
+                                <p:cTn id="19" presetID="1" presetClass="entr" presetSubtype="0" fill="hold" grpId="0" nodeType="withEffect">
+                                  <p:stCondLst>
+                                    <p:cond delay="0"/>
+                                  </p:stCondLst>
+                                  <p:childTnLst>
+                                    <p:set>
+                                      <p:cBhvr>
+                                        <p:cTn id="20" dur="1" fill="hold">
+                                          <p:stCondLst>
+                                            <p:cond delay="0"/>
+                                          </p:stCondLst>
+                                        </p:cTn>
+                                        <p:tgtEl>
+                                          <p:spTgt spid="3">
+                                            <p:txEl>
+                                              <p:pRg st="7" end="7"/>
+                                            </p:txEl>
+                                          </p:spTgt>
+                                        </p:tgtEl>
+                                        <p:attrNameLst>
+                                          <p:attrName>style.visibility</p:attrName>
+                                        </p:attrNameLst>
+                                      </p:cBhvr>
+                                      <p:to>
+                                        <p:strVal val="visible"/>
+                                      </p:to>
+                                    </p:set>
+                                  </p:childTnLst>
+                                </p:cTn>
+                              </p:par>
+                            </p:childTnLst>
+                          </p:cTn>
+                        </p:par>
+                      </p:childTnLst>
+                    </p:cTn>
+                  </p:par>
+                </p:childTnLst>
+              </p:cTn>
+              <p:prevCondLst>
+                <p:cond evt="onPrev" delay="0">
+                  <p:tgtEl>
+                    <p:sldTgt/>
+                  </p:tgtEl>
+                </p:cond>
+              </p:prevCondLst>
+              <p:nextCondLst>
+                <p:cond evt="onNext" delay="0">
+                  <p:tgtEl>
+                    <p:sldTgt/>
+                  </p:tgtEl>
+                </p:cond>
+              </p:nextCondLst>
+            </p:seq>
+          </p:childTnLst>
+        </p:cTn>
+      </p:par>
+    </p:tnLst>
+    <p:bldLst>
+      <p:bldP spid="3" grpId="0" build="p"/>
+    </p:bldLst>
+  </p:timing>
+</p:sld>
+</file>
+
+<file path=ppt/slides/slide11.xml><?xml version="1.0" encoding="utf-8"?>
+<p:sld xmlns:a="http://schemas.openxmlformats.org/drawingml/2006/main" xmlns:r="http://schemas.openxmlformats.org/officeDocument/2006/relationships" xmlns:p="http://schemas.openxmlformats.org/presentationml/2006/main">
+  <p:cSld>
+    <p:spTree>
+      <p:nvGrpSpPr>
+        <p:cNvPr id="1" name=""/>
+        <p:cNvGrpSpPr/>
+        <p:nvPr/>
+      </p:nvGrpSpPr>
+      <p:grpSpPr>
+        <a:xfrm>
+          <a:off x="0" y="0"/>
+          <a:ext cx="0" cy="0"/>
+          <a:chOff x="0" y="0"/>
+          <a:chExt cx="0" cy="0"/>
+        </a:xfrm>
+      </p:grpSpPr>
+      <p:sp>
+        <p:nvSpPr>
           <p:cNvPr id="2" name="Title 1">
             <a:extLst>
               <a:ext uri="{FF2B5EF4-FFF2-40B4-BE49-F238E27FC236}">
@@ -21801,7 +22210,7 @@
 </p:sld>
 </file>
 
-<file path=ppt/slides/slide11.xml><?xml version="1.0" encoding="utf-8"?>
+<file path=ppt/slides/slide12.xml><?xml version="1.0" encoding="utf-8"?>
 <p:sld xmlns:a="http://schemas.openxmlformats.org/drawingml/2006/main" xmlns:r="http://schemas.openxmlformats.org/officeDocument/2006/relationships" xmlns:p="http://schemas.openxmlformats.org/presentationml/2006/main">
   <p:cSld>
     <p:spTree>
@@ -22540,7 +22949,7 @@
 </p:sld>
 </file>
 
-<file path=ppt/slides/slide12.xml><?xml version="1.0" encoding="utf-8"?>
+<file path=ppt/slides/slide13.xml><?xml version="1.0" encoding="utf-8"?>
 <p:sld xmlns:a="http://schemas.openxmlformats.org/drawingml/2006/main" xmlns:r="http://schemas.openxmlformats.org/officeDocument/2006/relationships" xmlns:p="http://schemas.openxmlformats.org/presentationml/2006/main">
   <p:cSld>
     <p:spTree>
@@ -22882,7 +23291,7 @@
 </p:sld>
 </file>
 
-<file path=ppt/slides/slide13.xml><?xml version="1.0" encoding="utf-8"?>
+<file path=ppt/slides/slide14.xml><?xml version="1.0" encoding="utf-8"?>
 <p:sld xmlns:a="http://schemas.openxmlformats.org/drawingml/2006/main" xmlns:r="http://schemas.openxmlformats.org/officeDocument/2006/relationships" xmlns:p="http://schemas.openxmlformats.org/presentationml/2006/main">
   <p:cSld>
     <p:spTree>
@@ -23655,7 +24064,7 @@
 </p:sld>
 </file>
 
-<file path=ppt/slides/slide14.xml><?xml version="1.0" encoding="utf-8"?>
+<file path=ppt/slides/slide15.xml><?xml version="1.0" encoding="utf-8"?>
 <p:sld xmlns:a="http://schemas.openxmlformats.org/drawingml/2006/main" xmlns:r="http://schemas.openxmlformats.org/officeDocument/2006/relationships" xmlns:p="http://schemas.openxmlformats.org/presentationml/2006/main">
   <p:cSld>
     <p:spTree>
@@ -24149,7 +24558,7 @@
 </p:sld>
 </file>
 
-<file path=ppt/slides/slide15.xml><?xml version="1.0" encoding="utf-8"?>
+<file path=ppt/slides/slide16.xml><?xml version="1.0" encoding="utf-8"?>
 <p:sld xmlns:a="http://schemas.openxmlformats.org/drawingml/2006/main" xmlns:r="http://schemas.openxmlformats.org/officeDocument/2006/relationships" xmlns:p="http://schemas.openxmlformats.org/presentationml/2006/main">
   <p:cSld>
     <p:spTree>
@@ -24600,7 +25009,7 @@
 </p:sld>
 </file>
 
-<file path=ppt/slides/slide16.xml><?xml version="1.0" encoding="utf-8"?>
+<file path=ppt/slides/slide17.xml><?xml version="1.0" encoding="utf-8"?>
 <p:sld xmlns:a="http://schemas.openxmlformats.org/drawingml/2006/main" xmlns:r="http://schemas.openxmlformats.org/officeDocument/2006/relationships" xmlns:p="http://schemas.openxmlformats.org/presentationml/2006/main">
   <p:cSld>
     <p:spTree>
@@ -24970,7 +25379,7 @@
 </p:sld>
 </file>
 
-<file path=ppt/slides/slide17.xml><?xml version="1.0" encoding="utf-8"?>
+<file path=ppt/slides/slide18.xml><?xml version="1.0" encoding="utf-8"?>
 <p:sld xmlns:a="http://schemas.openxmlformats.org/drawingml/2006/main" xmlns:r="http://schemas.openxmlformats.org/officeDocument/2006/relationships" xmlns:p="http://schemas.openxmlformats.org/presentationml/2006/main">
   <p:cSld>
     <p:spTree>
@@ -25887,7 +26296,7 @@
 </p:sld>
 </file>
 
-<file path=ppt/slides/slide18.xml><?xml version="1.0" encoding="utf-8"?>
+<file path=ppt/slides/slide19.xml><?xml version="1.0" encoding="utf-8"?>
 <p:sld xmlns:a="http://schemas.openxmlformats.org/drawingml/2006/main" xmlns:r="http://schemas.openxmlformats.org/officeDocument/2006/relationships" xmlns:p="http://schemas.openxmlformats.org/presentationml/2006/main">
   <p:cSld>
     <p:spTree>
@@ -26041,7 +26450,115 @@
 </p:sld>
 </file>
 
-<file path=ppt/slides/slide19.xml><?xml version="1.0" encoding="utf-8"?>
+<file path=ppt/slides/slide2.xml><?xml version="1.0" encoding="utf-8"?>
+<p:sld xmlns:a="http://schemas.openxmlformats.org/drawingml/2006/main" xmlns:r="http://schemas.openxmlformats.org/officeDocument/2006/relationships" xmlns:p="http://schemas.openxmlformats.org/presentationml/2006/main">
+  <p:cSld>
+    <p:spTree>
+      <p:nvGrpSpPr>
+        <p:cNvPr id="1" name=""/>
+        <p:cNvGrpSpPr/>
+        <p:nvPr/>
+      </p:nvGrpSpPr>
+      <p:grpSpPr>
+        <a:xfrm>
+          <a:off x="0" y="0"/>
+          <a:ext cx="0" cy="0"/>
+          <a:chOff x="0" y="0"/>
+          <a:chExt cx="0" cy="0"/>
+        </a:xfrm>
+      </p:grpSpPr>
+      <p:sp>
+        <p:nvSpPr>
+          <p:cNvPr id="2" name="Title 1">
+            <a:extLst>
+              <a:ext uri="{FF2B5EF4-FFF2-40B4-BE49-F238E27FC236}">
+                <a16:creationId xmlns:a16="http://schemas.microsoft.com/office/drawing/2014/main" id="{015B3E91-728D-46F7-BC27-E41AC0779C0C}"/>
+              </a:ext>
+            </a:extLst>
+          </p:cNvPr>
+          <p:cNvSpPr>
+            <a:spLocks noGrp="1"/>
+          </p:cNvSpPr>
+          <p:nvPr>
+            <p:ph type="title"/>
+          </p:nvPr>
+        </p:nvSpPr>
+        <p:spPr/>
+        <p:txBody>
+          <a:bodyPr/>
+          <a:lstStyle/>
+          <a:p>
+            <a:r>
+              <a:rPr lang="en-US" dirty="0"/>
+              <a:t>Covid-19</a:t>
+            </a:r>
+            <a:endParaRPr lang="sk-SK" dirty="0"/>
+          </a:p>
+        </p:txBody>
+      </p:sp>
+      <p:pic>
+        <p:nvPicPr>
+          <p:cNvPr id="1026" name="Picture 2" descr="Image result for covid-19 wiki">
+            <a:extLst>
+              <a:ext uri="{FF2B5EF4-FFF2-40B4-BE49-F238E27FC236}">
+                <a16:creationId xmlns:a16="http://schemas.microsoft.com/office/drawing/2014/main" id="{974B783A-1081-4766-91E4-FCE86D7C3F93}"/>
+              </a:ext>
+            </a:extLst>
+          </p:cNvPr>
+          <p:cNvPicPr>
+            <a:picLocks noGrp="1" noChangeAspect="1" noChangeArrowheads="1"/>
+          </p:cNvPicPr>
+          <p:nvPr>
+            <p:ph idx="1"/>
+          </p:nvPr>
+        </p:nvPicPr>
+        <p:blipFill>
+          <a:blip r:embed="rId2">
+            <a:extLst>
+              <a:ext uri="{28A0092B-C50C-407E-A947-70E740481C1C}">
+                <a14:useLocalDpi xmlns:a14="http://schemas.microsoft.com/office/drawing/2010/main" val="0"/>
+              </a:ext>
+            </a:extLst>
+          </a:blip>
+          <a:srcRect/>
+          <a:stretch>
+            <a:fillRect/>
+          </a:stretch>
+        </p:blipFill>
+        <p:spPr bwMode="auto">
+          <a:xfrm>
+            <a:off x="4817269" y="3225800"/>
+            <a:ext cx="2133600" cy="2143125"/>
+          </a:xfrm>
+          <a:prstGeom prst="rect">
+            <a:avLst/>
+          </a:prstGeom>
+          <a:noFill/>
+          <a:extLst>
+            <a:ext uri="{909E8E84-426E-40DD-AFC4-6F175D3DCCD1}">
+              <a14:hiddenFill xmlns:a14="http://schemas.microsoft.com/office/drawing/2010/main">
+                <a:solidFill>
+                  <a:srgbClr val="FFFFFF"/>
+                </a:solidFill>
+              </a14:hiddenFill>
+            </a:ext>
+          </a:extLst>
+        </p:spPr>
+      </p:pic>
+    </p:spTree>
+    <p:extLst>
+      <p:ext uri="{BB962C8B-B14F-4D97-AF65-F5344CB8AC3E}">
+        <p14:creationId xmlns:p14="http://schemas.microsoft.com/office/powerpoint/2010/main" val="2828183496"/>
+      </p:ext>
+    </p:extLst>
+  </p:cSld>
+  <p:clrMapOvr>
+    <a:masterClrMapping/>
+  </p:clrMapOvr>
+</p:sld>
+</file>
+
+<file path=ppt/slides/slide20.xml><?xml version="1.0" encoding="utf-8"?>
 <p:sld xmlns:a="http://schemas.openxmlformats.org/drawingml/2006/main" xmlns:r="http://schemas.openxmlformats.org/officeDocument/2006/relationships" xmlns:p="http://schemas.openxmlformats.org/presentationml/2006/main">
   <p:cSld>
     <p:spTree>
@@ -26489,7 +27006,857 @@
 </p:sld>
 </file>
 
-<file path=ppt/slides/slide2.xml><?xml version="1.0" encoding="utf-8"?>
+<file path=ppt/slides/slide21.xml><?xml version="1.0" encoding="utf-8"?>
+<p:sld xmlns:a="http://schemas.openxmlformats.org/drawingml/2006/main" xmlns:r="http://schemas.openxmlformats.org/officeDocument/2006/relationships" xmlns:p="http://schemas.openxmlformats.org/presentationml/2006/main">
+  <p:cSld>
+    <p:spTree>
+      <p:nvGrpSpPr>
+        <p:cNvPr id="1" name=""/>
+        <p:cNvGrpSpPr/>
+        <p:nvPr/>
+      </p:nvGrpSpPr>
+      <p:grpSpPr>
+        <a:xfrm>
+          <a:off x="0" y="0"/>
+          <a:ext cx="0" cy="0"/>
+          <a:chOff x="0" y="0"/>
+          <a:chExt cx="0" cy="0"/>
+        </a:xfrm>
+      </p:grpSpPr>
+      <p:sp>
+        <p:nvSpPr>
+          <p:cNvPr id="2" name="Title 1">
+            <a:extLst>
+              <a:ext uri="{FF2B5EF4-FFF2-40B4-BE49-F238E27FC236}">
+                <a16:creationId xmlns:a16="http://schemas.microsoft.com/office/drawing/2014/main" id="{18478C94-698F-4DC3-B942-038194B746ED}"/>
+              </a:ext>
+            </a:extLst>
+          </p:cNvPr>
+          <p:cNvSpPr>
+            <a:spLocks noGrp="1"/>
+          </p:cNvSpPr>
+          <p:nvPr>
+            <p:ph type="title"/>
+          </p:nvPr>
+        </p:nvSpPr>
+        <p:spPr/>
+        <p:txBody>
+          <a:bodyPr/>
+          <a:lstStyle/>
+          <a:p>
+            <a:r>
+              <a:rPr lang="en-US" dirty="0" err="1"/>
+              <a:t>Scrutor</a:t>
+            </a:r>
+            <a:endParaRPr lang="sk-SK" dirty="0"/>
+          </a:p>
+        </p:txBody>
+      </p:sp>
+      <p:sp>
+        <p:nvSpPr>
+          <p:cNvPr id="3" name="Content Placeholder 2">
+            <a:extLst>
+              <a:ext uri="{FF2B5EF4-FFF2-40B4-BE49-F238E27FC236}">
+                <a16:creationId xmlns:a16="http://schemas.microsoft.com/office/drawing/2014/main" id="{31BC17AA-65BD-4D48-812C-6253BA11C512}"/>
+              </a:ext>
+            </a:extLst>
+          </p:cNvPr>
+          <p:cNvSpPr>
+            <a:spLocks noGrp="1"/>
+          </p:cNvSpPr>
+          <p:nvPr>
+            <p:ph idx="1"/>
+          </p:nvPr>
+        </p:nvSpPr>
+        <p:spPr/>
+        <p:txBody>
+          <a:bodyPr>
+            <a:normAutofit/>
+          </a:bodyPr>
+          <a:lstStyle/>
+          <a:p>
+            <a:r>
+              <a:rPr lang="sk-SK" dirty="0" err="1"/>
+              <a:t>Knihovna</a:t>
+            </a:r>
+            <a:r>
+              <a:rPr lang="sk-SK" dirty="0"/>
+              <a:t>, </a:t>
+            </a:r>
+            <a:r>
+              <a:rPr lang="sk-SK" dirty="0" err="1"/>
+              <a:t>která</a:t>
+            </a:r>
+            <a:r>
+              <a:rPr lang="sk-SK" dirty="0"/>
+              <a:t> </a:t>
+            </a:r>
+            <a:r>
+              <a:rPr lang="sk-SK" dirty="0" err="1"/>
+              <a:t>pomůže</a:t>
+            </a:r>
+            <a:r>
+              <a:rPr lang="sk-SK" dirty="0"/>
+              <a:t> s </a:t>
+            </a:r>
+            <a:r>
+              <a:rPr lang="sk-SK" dirty="0" err="1"/>
+              <a:t>registrací</a:t>
+            </a:r>
+            <a:r>
+              <a:rPr lang="sk-SK" dirty="0"/>
+              <a:t> závislostí, pracuje nad </a:t>
+            </a:r>
+            <a:r>
+              <a:rPr lang="sk-SK" dirty="0" err="1"/>
+              <a:t>IServiceCollection</a:t>
+            </a:r>
+            <a:endParaRPr lang="sk-SK" dirty="0"/>
+          </a:p>
+          <a:p>
+            <a:r>
+              <a:rPr lang="sk-SK" dirty="0" err="1"/>
+              <a:t>Možnost</a:t>
+            </a:r>
+            <a:r>
+              <a:rPr lang="sk-SK" dirty="0"/>
+              <a:t> </a:t>
+            </a:r>
+            <a:r>
+              <a:rPr lang="sk-SK" dirty="0" err="1"/>
+              <a:t>registrovat</a:t>
+            </a:r>
+            <a:r>
+              <a:rPr lang="sk-SK" dirty="0"/>
+              <a:t> </a:t>
+            </a:r>
+            <a:r>
+              <a:rPr lang="sk-SK" dirty="0" err="1"/>
+              <a:t>všechny</a:t>
+            </a:r>
+            <a:r>
+              <a:rPr lang="sk-SK" dirty="0"/>
+              <a:t> </a:t>
+            </a:r>
+            <a:r>
+              <a:rPr lang="sk-SK" dirty="0" err="1"/>
+              <a:t>třídy</a:t>
+            </a:r>
+            <a:r>
+              <a:rPr lang="sk-SK" dirty="0"/>
+              <a:t>, </a:t>
+            </a:r>
+            <a:r>
+              <a:rPr lang="sk-SK" dirty="0" err="1"/>
+              <a:t>které</a:t>
+            </a:r>
+            <a:r>
+              <a:rPr lang="sk-SK" dirty="0"/>
+              <a:t>:</a:t>
+            </a:r>
+          </a:p>
+          <a:p>
+            <a:pPr lvl="1"/>
+            <a:r>
+              <a:rPr lang="sk-SK" dirty="0" err="1"/>
+              <a:t>Dědí</a:t>
+            </a:r>
+            <a:r>
+              <a:rPr lang="sk-SK" dirty="0"/>
+              <a:t> od </a:t>
+            </a:r>
+            <a:r>
+              <a:rPr lang="sk-SK" dirty="0" err="1"/>
+              <a:t>některé</a:t>
+            </a:r>
+            <a:r>
+              <a:rPr lang="sk-SK" dirty="0"/>
+              <a:t> </a:t>
+            </a:r>
+            <a:r>
+              <a:rPr lang="sk-SK" dirty="0" err="1"/>
+              <a:t>třídy</a:t>
+            </a:r>
+            <a:endParaRPr lang="sk-SK" dirty="0"/>
+          </a:p>
+          <a:p>
+            <a:pPr lvl="1"/>
+            <a:r>
+              <a:rPr lang="sk-SK" dirty="0" err="1"/>
+              <a:t>Implementují</a:t>
+            </a:r>
+            <a:r>
+              <a:rPr lang="sk-SK" dirty="0"/>
+              <a:t> </a:t>
+            </a:r>
+            <a:r>
+              <a:rPr lang="sk-SK" dirty="0" err="1"/>
+              <a:t>některý</a:t>
+            </a:r>
+            <a:r>
+              <a:rPr lang="sk-SK" dirty="0"/>
+              <a:t> interface</a:t>
+            </a:r>
+          </a:p>
+          <a:p>
+            <a:pPr lvl="1"/>
+            <a:r>
+              <a:rPr lang="sk-SK" dirty="0"/>
+              <a:t>...</a:t>
+            </a:r>
+          </a:p>
+          <a:p>
+            <a:pPr marL="128016" lvl="1" indent="0">
+              <a:buNone/>
+            </a:pPr>
+            <a:r>
+              <a:rPr lang="sk-SK" sz="2200" dirty="0"/>
+              <a:t>Dá </a:t>
+            </a:r>
+            <a:r>
+              <a:rPr lang="sk-SK" sz="2200" dirty="0" err="1"/>
+              <a:t>se</a:t>
+            </a:r>
+            <a:r>
+              <a:rPr lang="sk-SK" sz="2200" dirty="0"/>
+              <a:t> </a:t>
+            </a:r>
+            <a:r>
+              <a:rPr lang="sk-SK" sz="2200" dirty="0" err="1"/>
+              <a:t>specifikovat</a:t>
+            </a:r>
+            <a:r>
+              <a:rPr lang="sk-SK" sz="2200" dirty="0"/>
+              <a:t> životní cyklus závislosti (</a:t>
+            </a:r>
+            <a:r>
+              <a:rPr lang="sk-SK" sz="2200" dirty="0" err="1"/>
+              <a:t>Singleton</a:t>
+            </a:r>
+            <a:r>
+              <a:rPr lang="sk-SK" sz="2200" dirty="0"/>
+              <a:t>, </a:t>
+            </a:r>
+            <a:r>
+              <a:rPr lang="sk-SK" sz="2200" dirty="0" err="1"/>
+              <a:t>Transient</a:t>
+            </a:r>
+            <a:r>
+              <a:rPr lang="sk-SK" sz="2200" dirty="0"/>
+              <a:t>...)</a:t>
+            </a:r>
+          </a:p>
+          <a:p>
+            <a:pPr marL="128016" lvl="1" indent="0">
+              <a:buNone/>
+            </a:pPr>
+            <a:r>
+              <a:rPr lang="sk-SK" sz="2200" dirty="0"/>
+              <a:t>Dá </a:t>
+            </a:r>
+            <a:r>
+              <a:rPr lang="sk-SK" sz="2200" dirty="0" err="1"/>
+              <a:t>se</a:t>
+            </a:r>
+            <a:r>
+              <a:rPr lang="sk-SK" sz="2200" dirty="0"/>
+              <a:t> </a:t>
+            </a:r>
+            <a:r>
+              <a:rPr lang="sk-SK" sz="2200" dirty="0" err="1"/>
+              <a:t>specifikovat</a:t>
+            </a:r>
+            <a:r>
+              <a:rPr lang="sk-SK" sz="2200" dirty="0"/>
+              <a:t> </a:t>
+            </a:r>
+            <a:r>
+              <a:rPr lang="sk-SK" sz="2200" dirty="0" err="1"/>
+              <a:t>zda</a:t>
+            </a:r>
+            <a:r>
+              <a:rPr lang="sk-SK" sz="2200" dirty="0"/>
+              <a:t> </a:t>
+            </a:r>
+            <a:r>
+              <a:rPr lang="sk-SK" sz="2200" dirty="0" err="1"/>
+              <a:t>se</a:t>
+            </a:r>
+            <a:r>
+              <a:rPr lang="sk-SK" sz="2200" dirty="0"/>
+              <a:t> </a:t>
+            </a:r>
+            <a:r>
+              <a:rPr lang="sk-SK" sz="2200" dirty="0" err="1"/>
+              <a:t>třídá</a:t>
+            </a:r>
+            <a:r>
+              <a:rPr lang="sk-SK" sz="2200" dirty="0"/>
+              <a:t> má dát </a:t>
+            </a:r>
+            <a:r>
+              <a:rPr lang="sk-SK" sz="2200" dirty="0" err="1"/>
+              <a:t>injekovat</a:t>
+            </a:r>
+            <a:r>
+              <a:rPr lang="sk-SK" sz="2200" dirty="0"/>
+              <a:t> jako:</a:t>
+            </a:r>
+          </a:p>
+          <a:p>
+            <a:pPr lvl="1"/>
+            <a:r>
+              <a:rPr lang="sk-SK" dirty="0" err="1"/>
+              <a:t>Třída</a:t>
+            </a:r>
+            <a:endParaRPr lang="sk-SK" dirty="0"/>
+          </a:p>
+          <a:p>
+            <a:pPr lvl="1"/>
+            <a:r>
+              <a:rPr lang="sk-SK" dirty="0"/>
+              <a:t>Interface, </a:t>
+            </a:r>
+            <a:r>
+              <a:rPr lang="sk-SK" dirty="0" err="1"/>
+              <a:t>který</a:t>
+            </a:r>
+            <a:r>
+              <a:rPr lang="sk-SK" dirty="0"/>
+              <a:t> </a:t>
+            </a:r>
+            <a:r>
+              <a:rPr lang="sk-SK" dirty="0" err="1"/>
+              <a:t>se</a:t>
+            </a:r>
+            <a:r>
+              <a:rPr lang="sk-SK" dirty="0"/>
+              <a:t> </a:t>
+            </a:r>
+            <a:r>
+              <a:rPr lang="sk-SK" dirty="0" err="1"/>
+              <a:t>jmenuje</a:t>
+            </a:r>
+            <a:r>
+              <a:rPr lang="sk-SK" dirty="0"/>
+              <a:t> </a:t>
+            </a:r>
+            <a:r>
+              <a:rPr lang="sk-SK" dirty="0" err="1"/>
+              <a:t>stejně</a:t>
+            </a:r>
+            <a:r>
+              <a:rPr lang="sk-SK" dirty="0"/>
+              <a:t> jako </a:t>
+            </a:r>
+            <a:r>
+              <a:rPr lang="sk-SK" dirty="0" err="1"/>
+              <a:t>třída</a:t>
+            </a:r>
+            <a:endParaRPr lang="sk-SK" dirty="0"/>
+          </a:p>
+          <a:p>
+            <a:pPr lvl="1"/>
+            <a:r>
+              <a:rPr lang="sk-SK" dirty="0" err="1"/>
+              <a:t>Libovolný</a:t>
+            </a:r>
+            <a:r>
+              <a:rPr lang="sk-SK" dirty="0"/>
+              <a:t> interface, </a:t>
+            </a:r>
+            <a:r>
+              <a:rPr lang="sk-SK" dirty="0" err="1"/>
+              <a:t>který</a:t>
+            </a:r>
+            <a:r>
+              <a:rPr lang="sk-SK" dirty="0"/>
+              <a:t> </a:t>
+            </a:r>
+            <a:r>
+              <a:rPr lang="sk-SK" dirty="0" err="1"/>
+              <a:t>třída</a:t>
+            </a:r>
+            <a:r>
+              <a:rPr lang="sk-SK" dirty="0"/>
+              <a:t> implementuje</a:t>
+            </a:r>
+          </a:p>
+          <a:p>
+            <a:pPr lvl="1"/>
+            <a:r>
+              <a:rPr lang="sk-SK" dirty="0"/>
+              <a:t>...</a:t>
+            </a:r>
+          </a:p>
+          <a:p>
+            <a:pPr marL="128016" lvl="1" indent="0">
+              <a:buNone/>
+            </a:pPr>
+            <a:endParaRPr lang="sk-SK" sz="2200" dirty="0"/>
+          </a:p>
+        </p:txBody>
+      </p:sp>
+    </p:spTree>
+    <p:extLst>
+      <p:ext uri="{BB962C8B-B14F-4D97-AF65-F5344CB8AC3E}">
+        <p14:creationId xmlns:p14="http://schemas.microsoft.com/office/powerpoint/2010/main" val="374064142"/>
+      </p:ext>
+    </p:extLst>
+  </p:cSld>
+  <p:clrMapOvr>
+    <a:masterClrMapping/>
+  </p:clrMapOvr>
+  <p:timing>
+    <p:tnLst>
+      <p:par>
+        <p:cTn id="1" dur="indefinite" restart="never" nodeType="tmRoot">
+          <p:childTnLst>
+            <p:seq concurrent="1" nextAc="seek">
+              <p:cTn id="2" dur="indefinite" nodeType="mainSeq">
+                <p:childTnLst>
+                  <p:par>
+                    <p:cTn id="3" fill="hold">
+                      <p:stCondLst>
+                        <p:cond delay="indefinite"/>
+                      </p:stCondLst>
+                      <p:childTnLst>
+                        <p:par>
+                          <p:cTn id="4" fill="hold">
+                            <p:stCondLst>
+                              <p:cond delay="0"/>
+                            </p:stCondLst>
+                            <p:childTnLst>
+                              <p:par>
+                                <p:cTn id="5" presetID="1" presetClass="entr" presetSubtype="0" fill="hold" grpId="0" nodeType="clickEffect">
+                                  <p:stCondLst>
+                                    <p:cond delay="0"/>
+                                  </p:stCondLst>
+                                  <p:childTnLst>
+                                    <p:set>
+                                      <p:cBhvr>
+                                        <p:cTn id="6" dur="1" fill="hold">
+                                          <p:stCondLst>
+                                            <p:cond delay="0"/>
+                                          </p:stCondLst>
+                                        </p:cTn>
+                                        <p:tgtEl>
+                                          <p:spTgt spid="3">
+                                            <p:txEl>
+                                              <p:pRg st="0" end="0"/>
+                                            </p:txEl>
+                                          </p:spTgt>
+                                        </p:tgtEl>
+                                        <p:attrNameLst>
+                                          <p:attrName>style.visibility</p:attrName>
+                                        </p:attrNameLst>
+                                      </p:cBhvr>
+                                      <p:to>
+                                        <p:strVal val="visible"/>
+                                      </p:to>
+                                    </p:set>
+                                  </p:childTnLst>
+                                </p:cTn>
+                              </p:par>
+                            </p:childTnLst>
+                          </p:cTn>
+                        </p:par>
+                      </p:childTnLst>
+                    </p:cTn>
+                  </p:par>
+                  <p:par>
+                    <p:cTn id="7" fill="hold">
+                      <p:stCondLst>
+                        <p:cond delay="indefinite"/>
+                      </p:stCondLst>
+                      <p:childTnLst>
+                        <p:par>
+                          <p:cTn id="8" fill="hold">
+                            <p:stCondLst>
+                              <p:cond delay="0"/>
+                            </p:stCondLst>
+                            <p:childTnLst>
+                              <p:par>
+                                <p:cTn id="9" presetID="1" presetClass="entr" presetSubtype="0" fill="hold" grpId="0" nodeType="clickEffect">
+                                  <p:stCondLst>
+                                    <p:cond delay="0"/>
+                                  </p:stCondLst>
+                                  <p:childTnLst>
+                                    <p:set>
+                                      <p:cBhvr>
+                                        <p:cTn id="10" dur="1" fill="hold">
+                                          <p:stCondLst>
+                                            <p:cond delay="0"/>
+                                          </p:stCondLst>
+                                        </p:cTn>
+                                        <p:tgtEl>
+                                          <p:spTgt spid="3">
+                                            <p:txEl>
+                                              <p:pRg st="1" end="1"/>
+                                            </p:txEl>
+                                          </p:spTgt>
+                                        </p:tgtEl>
+                                        <p:attrNameLst>
+                                          <p:attrName>style.visibility</p:attrName>
+                                        </p:attrNameLst>
+                                      </p:cBhvr>
+                                      <p:to>
+                                        <p:strVal val="visible"/>
+                                      </p:to>
+                                    </p:set>
+                                  </p:childTnLst>
+                                </p:cTn>
+                              </p:par>
+                              <p:par>
+                                <p:cTn id="11" presetID="1" presetClass="entr" presetSubtype="0" fill="hold" grpId="0" nodeType="withEffect">
+                                  <p:stCondLst>
+                                    <p:cond delay="0"/>
+                                  </p:stCondLst>
+                                  <p:childTnLst>
+                                    <p:set>
+                                      <p:cBhvr>
+                                        <p:cTn id="12" dur="1" fill="hold">
+                                          <p:stCondLst>
+                                            <p:cond delay="0"/>
+                                          </p:stCondLst>
+                                        </p:cTn>
+                                        <p:tgtEl>
+                                          <p:spTgt spid="3">
+                                            <p:txEl>
+                                              <p:pRg st="2" end="2"/>
+                                            </p:txEl>
+                                          </p:spTgt>
+                                        </p:tgtEl>
+                                        <p:attrNameLst>
+                                          <p:attrName>style.visibility</p:attrName>
+                                        </p:attrNameLst>
+                                      </p:cBhvr>
+                                      <p:to>
+                                        <p:strVal val="visible"/>
+                                      </p:to>
+                                    </p:set>
+                                  </p:childTnLst>
+                                </p:cTn>
+                              </p:par>
+                              <p:par>
+                                <p:cTn id="13" presetID="1" presetClass="entr" presetSubtype="0" fill="hold" grpId="0" nodeType="withEffect">
+                                  <p:stCondLst>
+                                    <p:cond delay="0"/>
+                                  </p:stCondLst>
+                                  <p:childTnLst>
+                                    <p:set>
+                                      <p:cBhvr>
+                                        <p:cTn id="14" dur="1" fill="hold">
+                                          <p:stCondLst>
+                                            <p:cond delay="0"/>
+                                          </p:stCondLst>
+                                        </p:cTn>
+                                        <p:tgtEl>
+                                          <p:spTgt spid="3">
+                                            <p:txEl>
+                                              <p:pRg st="3" end="3"/>
+                                            </p:txEl>
+                                          </p:spTgt>
+                                        </p:tgtEl>
+                                        <p:attrNameLst>
+                                          <p:attrName>style.visibility</p:attrName>
+                                        </p:attrNameLst>
+                                      </p:cBhvr>
+                                      <p:to>
+                                        <p:strVal val="visible"/>
+                                      </p:to>
+                                    </p:set>
+                                  </p:childTnLst>
+                                </p:cTn>
+                              </p:par>
+                              <p:par>
+                                <p:cTn id="15" presetID="1" presetClass="entr" presetSubtype="0" fill="hold" grpId="0" nodeType="withEffect">
+                                  <p:stCondLst>
+                                    <p:cond delay="0"/>
+                                  </p:stCondLst>
+                                  <p:childTnLst>
+                                    <p:set>
+                                      <p:cBhvr>
+                                        <p:cTn id="16" dur="1" fill="hold">
+                                          <p:stCondLst>
+                                            <p:cond delay="0"/>
+                                          </p:stCondLst>
+                                        </p:cTn>
+                                        <p:tgtEl>
+                                          <p:spTgt spid="3">
+                                            <p:txEl>
+                                              <p:pRg st="4" end="4"/>
+                                            </p:txEl>
+                                          </p:spTgt>
+                                        </p:tgtEl>
+                                        <p:attrNameLst>
+                                          <p:attrName>style.visibility</p:attrName>
+                                        </p:attrNameLst>
+                                      </p:cBhvr>
+                                      <p:to>
+                                        <p:strVal val="visible"/>
+                                      </p:to>
+                                    </p:set>
+                                  </p:childTnLst>
+                                </p:cTn>
+                              </p:par>
+                            </p:childTnLst>
+                          </p:cTn>
+                        </p:par>
+                      </p:childTnLst>
+                    </p:cTn>
+                  </p:par>
+                  <p:par>
+                    <p:cTn id="17" fill="hold">
+                      <p:stCondLst>
+                        <p:cond delay="indefinite"/>
+                      </p:stCondLst>
+                      <p:childTnLst>
+                        <p:par>
+                          <p:cTn id="18" fill="hold">
+                            <p:stCondLst>
+                              <p:cond delay="0"/>
+                            </p:stCondLst>
+                            <p:childTnLst>
+                              <p:par>
+                                <p:cTn id="19" presetID="1" presetClass="entr" presetSubtype="0" fill="hold" grpId="0" nodeType="clickEffect">
+                                  <p:stCondLst>
+                                    <p:cond delay="0"/>
+                                  </p:stCondLst>
+                                  <p:childTnLst>
+                                    <p:set>
+                                      <p:cBhvr>
+                                        <p:cTn id="20" dur="1" fill="hold">
+                                          <p:stCondLst>
+                                            <p:cond delay="0"/>
+                                          </p:stCondLst>
+                                        </p:cTn>
+                                        <p:tgtEl>
+                                          <p:spTgt spid="3">
+                                            <p:txEl>
+                                              <p:pRg st="5" end="5"/>
+                                            </p:txEl>
+                                          </p:spTgt>
+                                        </p:tgtEl>
+                                        <p:attrNameLst>
+                                          <p:attrName>style.visibility</p:attrName>
+                                        </p:attrNameLst>
+                                      </p:cBhvr>
+                                      <p:to>
+                                        <p:strVal val="visible"/>
+                                      </p:to>
+                                    </p:set>
+                                  </p:childTnLst>
+                                </p:cTn>
+                              </p:par>
+                            </p:childTnLst>
+                          </p:cTn>
+                        </p:par>
+                      </p:childTnLst>
+                    </p:cTn>
+                  </p:par>
+                  <p:par>
+                    <p:cTn id="21" fill="hold">
+                      <p:stCondLst>
+                        <p:cond delay="indefinite"/>
+                      </p:stCondLst>
+                      <p:childTnLst>
+                        <p:par>
+                          <p:cTn id="22" fill="hold">
+                            <p:stCondLst>
+                              <p:cond delay="0"/>
+                            </p:stCondLst>
+                            <p:childTnLst>
+                              <p:par>
+                                <p:cTn id="23" presetID="1" presetClass="entr" presetSubtype="0" fill="hold" grpId="0" nodeType="clickEffect">
+                                  <p:stCondLst>
+                                    <p:cond delay="0"/>
+                                  </p:stCondLst>
+                                  <p:childTnLst>
+                                    <p:set>
+                                      <p:cBhvr>
+                                        <p:cTn id="24" dur="1" fill="hold">
+                                          <p:stCondLst>
+                                            <p:cond delay="0"/>
+                                          </p:stCondLst>
+                                        </p:cTn>
+                                        <p:tgtEl>
+                                          <p:spTgt spid="3">
+                                            <p:txEl>
+                                              <p:pRg st="6" end="6"/>
+                                            </p:txEl>
+                                          </p:spTgt>
+                                        </p:tgtEl>
+                                        <p:attrNameLst>
+                                          <p:attrName>style.visibility</p:attrName>
+                                        </p:attrNameLst>
+                                      </p:cBhvr>
+                                      <p:to>
+                                        <p:strVal val="visible"/>
+                                      </p:to>
+                                    </p:set>
+                                  </p:childTnLst>
+                                </p:cTn>
+                              </p:par>
+                              <p:par>
+                                <p:cTn id="25" presetID="1" presetClass="entr" presetSubtype="0" fill="hold" grpId="0" nodeType="withEffect">
+                                  <p:stCondLst>
+                                    <p:cond delay="0"/>
+                                  </p:stCondLst>
+                                  <p:childTnLst>
+                                    <p:set>
+                                      <p:cBhvr>
+                                        <p:cTn id="26" dur="1" fill="hold">
+                                          <p:stCondLst>
+                                            <p:cond delay="0"/>
+                                          </p:stCondLst>
+                                        </p:cTn>
+                                        <p:tgtEl>
+                                          <p:spTgt spid="3">
+                                            <p:txEl>
+                                              <p:pRg st="7" end="7"/>
+                                            </p:txEl>
+                                          </p:spTgt>
+                                        </p:tgtEl>
+                                        <p:attrNameLst>
+                                          <p:attrName>style.visibility</p:attrName>
+                                        </p:attrNameLst>
+                                      </p:cBhvr>
+                                      <p:to>
+                                        <p:strVal val="visible"/>
+                                      </p:to>
+                                    </p:set>
+                                  </p:childTnLst>
+                                </p:cTn>
+                              </p:par>
+                              <p:par>
+                                <p:cTn id="27" presetID="1" presetClass="entr" presetSubtype="0" fill="hold" grpId="0" nodeType="withEffect">
+                                  <p:stCondLst>
+                                    <p:cond delay="0"/>
+                                  </p:stCondLst>
+                                  <p:childTnLst>
+                                    <p:set>
+                                      <p:cBhvr>
+                                        <p:cTn id="28" dur="1" fill="hold">
+                                          <p:stCondLst>
+                                            <p:cond delay="0"/>
+                                          </p:stCondLst>
+                                        </p:cTn>
+                                        <p:tgtEl>
+                                          <p:spTgt spid="3">
+                                            <p:txEl>
+                                              <p:pRg st="8" end="8"/>
+                                            </p:txEl>
+                                          </p:spTgt>
+                                        </p:tgtEl>
+                                        <p:attrNameLst>
+                                          <p:attrName>style.visibility</p:attrName>
+                                        </p:attrNameLst>
+                                      </p:cBhvr>
+                                      <p:to>
+                                        <p:strVal val="visible"/>
+                                      </p:to>
+                                    </p:set>
+                                  </p:childTnLst>
+                                </p:cTn>
+                              </p:par>
+                              <p:par>
+                                <p:cTn id="29" presetID="1" presetClass="entr" presetSubtype="0" fill="hold" grpId="0" nodeType="withEffect">
+                                  <p:stCondLst>
+                                    <p:cond delay="0"/>
+                                  </p:stCondLst>
+                                  <p:childTnLst>
+                                    <p:set>
+                                      <p:cBhvr>
+                                        <p:cTn id="30" dur="1" fill="hold">
+                                          <p:stCondLst>
+                                            <p:cond delay="0"/>
+                                          </p:stCondLst>
+                                        </p:cTn>
+                                        <p:tgtEl>
+                                          <p:spTgt spid="3">
+                                            <p:txEl>
+                                              <p:pRg st="9" end="9"/>
+                                            </p:txEl>
+                                          </p:spTgt>
+                                        </p:tgtEl>
+                                        <p:attrNameLst>
+                                          <p:attrName>style.visibility</p:attrName>
+                                        </p:attrNameLst>
+                                      </p:cBhvr>
+                                      <p:to>
+                                        <p:strVal val="visible"/>
+                                      </p:to>
+                                    </p:set>
+                                  </p:childTnLst>
+                                </p:cTn>
+                              </p:par>
+                              <p:par>
+                                <p:cTn id="31" presetID="1" presetClass="entr" presetSubtype="0" fill="hold" grpId="0" nodeType="withEffect">
+                                  <p:stCondLst>
+                                    <p:cond delay="0"/>
+                                  </p:stCondLst>
+                                  <p:childTnLst>
+                                    <p:set>
+                                      <p:cBhvr>
+                                        <p:cTn id="32" dur="1" fill="hold">
+                                          <p:stCondLst>
+                                            <p:cond delay="0"/>
+                                          </p:stCondLst>
+                                        </p:cTn>
+                                        <p:tgtEl>
+                                          <p:spTgt spid="3">
+                                            <p:txEl>
+                                              <p:pRg st="10" end="10"/>
+                                            </p:txEl>
+                                          </p:spTgt>
+                                        </p:tgtEl>
+                                        <p:attrNameLst>
+                                          <p:attrName>style.visibility</p:attrName>
+                                        </p:attrNameLst>
+                                      </p:cBhvr>
+                                      <p:to>
+                                        <p:strVal val="visible"/>
+                                      </p:to>
+                                    </p:set>
+                                  </p:childTnLst>
+                                </p:cTn>
+                              </p:par>
+                            </p:childTnLst>
+                          </p:cTn>
+                        </p:par>
+                      </p:childTnLst>
+                    </p:cTn>
+                  </p:par>
+                </p:childTnLst>
+              </p:cTn>
+              <p:prevCondLst>
+                <p:cond evt="onPrev" delay="0">
+                  <p:tgtEl>
+                    <p:sldTgt/>
+                  </p:tgtEl>
+                </p:cond>
+              </p:prevCondLst>
+              <p:nextCondLst>
+                <p:cond evt="onNext" delay="0">
+                  <p:tgtEl>
+                    <p:sldTgt/>
+                  </p:tgtEl>
+                </p:cond>
+              </p:nextCondLst>
+            </p:seq>
+          </p:childTnLst>
+        </p:cTn>
+      </p:par>
+    </p:tnLst>
+    <p:bldLst>
+      <p:bldP spid="3" grpId="0" uiExpand="1" build="p"/>
+    </p:bldLst>
+  </p:timing>
+</p:sld>
+</file>
+
+<file path=ppt/slides/slide3.xml><?xml version="1.0" encoding="utf-8"?>
 <p:sld xmlns:a="http://schemas.openxmlformats.org/drawingml/2006/main" xmlns:r="http://schemas.openxmlformats.org/officeDocument/2006/relationships" xmlns:p="http://schemas.openxmlformats.org/presentationml/2006/main">
   <p:cSld>
     <p:spTree>
@@ -26978,7 +28345,7 @@
 </p:sld>
 </file>
 
-<file path=ppt/slides/slide3.xml><?xml version="1.0" encoding="utf-8"?>
+<file path=ppt/slides/slide4.xml><?xml version="1.0" encoding="utf-8"?>
 <p:sld xmlns:a="http://schemas.openxmlformats.org/drawingml/2006/main" xmlns:r="http://schemas.openxmlformats.org/officeDocument/2006/relationships" xmlns:p="http://schemas.openxmlformats.org/presentationml/2006/main">
   <p:cSld>
     <p:spTree>
@@ -28055,7 +29422,7 @@
 </p:sld>
 </file>
 
-<file path=ppt/slides/slide4.xml><?xml version="1.0" encoding="utf-8"?>
+<file path=ppt/slides/slide5.xml><?xml version="1.0" encoding="utf-8"?>
 <p:sld xmlns:a="http://schemas.openxmlformats.org/drawingml/2006/main" xmlns:r="http://schemas.openxmlformats.org/officeDocument/2006/relationships" xmlns:p="http://schemas.openxmlformats.org/presentationml/2006/main">
   <p:cSld>
     <p:spTree>
@@ -28157,7 +29524,7 @@
 </p:sld>
 </file>
 
-<file path=ppt/slides/slide5.xml><?xml version="1.0" encoding="utf-8"?>
+<file path=ppt/slides/slide6.xml><?xml version="1.0" encoding="utf-8"?>
 <p:sld xmlns:a="http://schemas.openxmlformats.org/drawingml/2006/main" xmlns:r="http://schemas.openxmlformats.org/officeDocument/2006/relationships" xmlns:p="http://schemas.openxmlformats.org/presentationml/2006/main">
   <p:cSld>
     <p:spTree>
@@ -28654,7 +30021,7 @@
 </p:sld>
 </file>
 
-<file path=ppt/slides/slide6.xml><?xml version="1.0" encoding="utf-8"?>
+<file path=ppt/slides/slide7.xml><?xml version="1.0" encoding="utf-8"?>
 <p:sld xmlns:a="http://schemas.openxmlformats.org/drawingml/2006/main" xmlns:r="http://schemas.openxmlformats.org/officeDocument/2006/relationships" xmlns:p="http://schemas.openxmlformats.org/presentationml/2006/main">
   <p:cSld>
     <p:spTree>
@@ -28975,7 +30342,7 @@
 </p:sld>
 </file>
 
-<file path=ppt/slides/slide7.xml><?xml version="1.0" encoding="utf-8"?>
+<file path=ppt/slides/slide8.xml><?xml version="1.0" encoding="utf-8"?>
 <p:sld xmlns:a="http://schemas.openxmlformats.org/drawingml/2006/main" xmlns:r="http://schemas.openxmlformats.org/officeDocument/2006/relationships" xmlns:p="http://schemas.openxmlformats.org/presentationml/2006/main">
   <p:cSld>
     <p:spTree>
@@ -29646,7 +31013,7 @@
 </p:sld>
 </file>
 
-<file path=ppt/slides/slide8.xml><?xml version="1.0" encoding="utf-8"?>
+<file path=ppt/slides/slide9.xml><?xml version="1.0" encoding="utf-8"?>
 <p:sld xmlns:a="http://schemas.openxmlformats.org/drawingml/2006/main" xmlns:r="http://schemas.openxmlformats.org/officeDocument/2006/relationships" xmlns:p="http://schemas.openxmlformats.org/presentationml/2006/main">
   <p:cSld>
     <p:spTree>
@@ -30320,413 +31687,6 @@
     </p:tnLst>
     <p:bldLst>
       <p:bldP spid="3" grpId="0" uiExpand="1" build="p"/>
-    </p:bldLst>
-  </p:timing>
-</p:sld>
-</file>
-
-<file path=ppt/slides/slide9.xml><?xml version="1.0" encoding="utf-8"?>
-<p:sld xmlns:a="http://schemas.openxmlformats.org/drawingml/2006/main" xmlns:r="http://schemas.openxmlformats.org/officeDocument/2006/relationships" xmlns:p="http://schemas.openxmlformats.org/presentationml/2006/main">
-  <p:cSld>
-    <p:spTree>
-      <p:nvGrpSpPr>
-        <p:cNvPr id="1" name=""/>
-        <p:cNvGrpSpPr/>
-        <p:nvPr/>
-      </p:nvGrpSpPr>
-      <p:grpSpPr>
-        <a:xfrm>
-          <a:off x="0" y="0"/>
-          <a:ext cx="0" cy="0"/>
-          <a:chOff x="0" y="0"/>
-          <a:chExt cx="0" cy="0"/>
-        </a:xfrm>
-      </p:grpSpPr>
-      <p:sp>
-        <p:nvSpPr>
-          <p:cNvPr id="2" name="Nadpis 1"/>
-          <p:cNvSpPr>
-            <a:spLocks noGrp="1"/>
-          </p:cNvSpPr>
-          <p:nvPr>
-            <p:ph type="title"/>
-          </p:nvPr>
-        </p:nvSpPr>
-        <p:spPr/>
-        <p:txBody>
-          <a:bodyPr/>
-          <a:lstStyle/>
-          <a:p>
-            <a:r>
-              <a:rPr lang="cs-CZ" dirty="0" err="1"/>
-              <a:t>INotifyCollectionChanged</a:t>
-            </a:r>
-            <a:endParaRPr lang="sk-SK" dirty="0"/>
-          </a:p>
-        </p:txBody>
-      </p:sp>
-      <p:sp>
-        <p:nvSpPr>
-          <p:cNvPr id="3" name="Zástupný symbol pro obsah 2"/>
-          <p:cNvSpPr>
-            <a:spLocks noGrp="1"/>
-          </p:cNvSpPr>
-          <p:nvPr>
-            <p:ph idx="1"/>
-          </p:nvPr>
-        </p:nvSpPr>
-        <p:spPr/>
-        <p:txBody>
-          <a:bodyPr/>
-          <a:lstStyle/>
-          <a:p>
-            <a:r>
-              <a:rPr lang="cs-CZ" b="1" dirty="0" err="1"/>
-              <a:t>ObservableCollection</a:t>
-            </a:r>
-            <a:r>
-              <a:rPr lang="cs-CZ" b="1" dirty="0"/>
-              <a:t>&lt;T&gt;</a:t>
-            </a:r>
-          </a:p>
-          <a:p>
-            <a:pPr lvl="1"/>
-            <a:r>
-              <a:rPr lang="cs-CZ" dirty="0"/>
-              <a:t>implementuje toto rozhraní</a:t>
-            </a:r>
-          </a:p>
-          <a:p>
-            <a:pPr lvl="1"/>
-            <a:endParaRPr lang="cs-CZ" dirty="0"/>
-          </a:p>
-          <a:p>
-            <a:r>
-              <a:rPr lang="cs-CZ" dirty="0"/>
-              <a:t>Vlastní kolekce</a:t>
-            </a:r>
-          </a:p>
-          <a:p>
-            <a:pPr lvl="1"/>
-            <a:r>
-              <a:rPr lang="cs-CZ" dirty="0"/>
-              <a:t>podporu přidáme</a:t>
-            </a:r>
-          </a:p>
-          <a:p>
-            <a:endParaRPr lang="cs-CZ" dirty="0"/>
-          </a:p>
-          <a:p>
-            <a:r>
-              <a:rPr lang="cs-CZ" dirty="0"/>
-              <a:t>Existující kolekce</a:t>
-            </a:r>
-          </a:p>
-          <a:p>
-            <a:pPr lvl="1"/>
-            <a:r>
-              <a:rPr lang="cs-CZ" dirty="0"/>
-              <a:t>např. napsat kolem ní "</a:t>
-            </a:r>
-            <a:r>
-              <a:rPr lang="cs-CZ" dirty="0" err="1"/>
-              <a:t>wrapper</a:t>
-            </a:r>
-            <a:r>
-              <a:rPr lang="cs-CZ" dirty="0"/>
-              <a:t>"</a:t>
-            </a:r>
-          </a:p>
-          <a:p>
-            <a:pPr lvl="1"/>
-            <a:endParaRPr lang="cs-CZ" dirty="0"/>
-          </a:p>
-          <a:p>
-            <a:endParaRPr lang="sk-SK" dirty="0"/>
-          </a:p>
-        </p:txBody>
-      </p:sp>
-    </p:spTree>
-    <p:extLst>
-      <p:ext uri="{BB962C8B-B14F-4D97-AF65-F5344CB8AC3E}">
-        <p14:creationId xmlns:p14="http://schemas.microsoft.com/office/powerpoint/2010/main" val="3262396528"/>
-      </p:ext>
-    </p:extLst>
-  </p:cSld>
-  <p:clrMapOvr>
-    <a:masterClrMapping/>
-  </p:clrMapOvr>
-  <p:timing>
-    <p:tnLst>
-      <p:par>
-        <p:cTn id="1" dur="indefinite" restart="never" nodeType="tmRoot">
-          <p:childTnLst>
-            <p:seq concurrent="1" nextAc="seek">
-              <p:cTn id="2" dur="indefinite" nodeType="mainSeq">
-                <p:childTnLst>
-                  <p:par>
-                    <p:cTn id="3" fill="hold">
-                      <p:stCondLst>
-                        <p:cond delay="indefinite"/>
-                      </p:stCondLst>
-                      <p:childTnLst>
-                        <p:par>
-                          <p:cTn id="4" fill="hold">
-                            <p:stCondLst>
-                              <p:cond delay="0"/>
-                            </p:stCondLst>
-                            <p:childTnLst>
-                              <p:par>
-                                <p:cTn id="5" presetID="1" presetClass="entr" presetSubtype="0" fill="hold" grpId="0" nodeType="clickEffect">
-                                  <p:stCondLst>
-                                    <p:cond delay="0"/>
-                                  </p:stCondLst>
-                                  <p:childTnLst>
-                                    <p:set>
-                                      <p:cBhvr>
-                                        <p:cTn id="6" dur="1" fill="hold">
-                                          <p:stCondLst>
-                                            <p:cond delay="0"/>
-                                          </p:stCondLst>
-                                        </p:cTn>
-                                        <p:tgtEl>
-                                          <p:spTgt spid="3">
-                                            <p:txEl>
-                                              <p:pRg st="0" end="0"/>
-                                            </p:txEl>
-                                          </p:spTgt>
-                                        </p:tgtEl>
-                                        <p:attrNameLst>
-                                          <p:attrName>style.visibility</p:attrName>
-                                        </p:attrNameLst>
-                                      </p:cBhvr>
-                                      <p:to>
-                                        <p:strVal val="visible"/>
-                                      </p:to>
-                                    </p:set>
-                                  </p:childTnLst>
-                                </p:cTn>
-                              </p:par>
-                              <p:par>
-                                <p:cTn id="7" presetID="1" presetClass="entr" presetSubtype="0" fill="hold" grpId="0" nodeType="withEffect">
-                                  <p:stCondLst>
-                                    <p:cond delay="0"/>
-                                  </p:stCondLst>
-                                  <p:childTnLst>
-                                    <p:set>
-                                      <p:cBhvr>
-                                        <p:cTn id="8" dur="1" fill="hold">
-                                          <p:stCondLst>
-                                            <p:cond delay="0"/>
-                                          </p:stCondLst>
-                                        </p:cTn>
-                                        <p:tgtEl>
-                                          <p:spTgt spid="3">
-                                            <p:txEl>
-                                              <p:pRg st="1" end="1"/>
-                                            </p:txEl>
-                                          </p:spTgt>
-                                        </p:tgtEl>
-                                        <p:attrNameLst>
-                                          <p:attrName>style.visibility</p:attrName>
-                                        </p:attrNameLst>
-                                      </p:cBhvr>
-                                      <p:to>
-                                        <p:strVal val="visible"/>
-                                      </p:to>
-                                    </p:set>
-                                  </p:childTnLst>
-                                </p:cTn>
-                              </p:par>
-                            </p:childTnLst>
-                          </p:cTn>
-                        </p:par>
-                      </p:childTnLst>
-                    </p:cTn>
-                  </p:par>
-                  <p:par>
-                    <p:cTn id="9" fill="hold">
-                      <p:stCondLst>
-                        <p:cond delay="indefinite"/>
-                      </p:stCondLst>
-                      <p:childTnLst>
-                        <p:par>
-                          <p:cTn id="10" fill="hold">
-                            <p:stCondLst>
-                              <p:cond delay="0"/>
-                            </p:stCondLst>
-                            <p:childTnLst>
-                              <p:par>
-                                <p:cTn id="11" presetID="1" presetClass="entr" presetSubtype="0" fill="hold" grpId="0" nodeType="clickEffect">
-                                  <p:stCondLst>
-                                    <p:cond delay="0"/>
-                                  </p:stCondLst>
-                                  <p:childTnLst>
-                                    <p:set>
-                                      <p:cBhvr>
-                                        <p:cTn id="12" dur="1" fill="hold">
-                                          <p:stCondLst>
-                                            <p:cond delay="0"/>
-                                          </p:stCondLst>
-                                        </p:cTn>
-                                        <p:tgtEl>
-                                          <p:spTgt spid="3">
-                                            <p:txEl>
-                                              <p:pRg st="3" end="3"/>
-                                            </p:txEl>
-                                          </p:spTgt>
-                                        </p:tgtEl>
-                                        <p:attrNameLst>
-                                          <p:attrName>style.visibility</p:attrName>
-                                        </p:attrNameLst>
-                                      </p:cBhvr>
-                                      <p:to>
-                                        <p:strVal val="visible"/>
-                                      </p:to>
-                                    </p:set>
-                                  </p:childTnLst>
-                                </p:cTn>
-                              </p:par>
-                              <p:par>
-                                <p:cTn id="13" presetID="1" presetClass="entr" presetSubtype="0" fill="hold" grpId="0" nodeType="withEffect">
-                                  <p:stCondLst>
-                                    <p:cond delay="0"/>
-                                  </p:stCondLst>
-                                  <p:childTnLst>
-                                    <p:set>
-                                      <p:cBhvr>
-                                        <p:cTn id="14" dur="1" fill="hold">
-                                          <p:stCondLst>
-                                            <p:cond delay="0"/>
-                                          </p:stCondLst>
-                                        </p:cTn>
-                                        <p:tgtEl>
-                                          <p:spTgt spid="3">
-                                            <p:txEl>
-                                              <p:pRg st="4" end="4"/>
-                                            </p:txEl>
-                                          </p:spTgt>
-                                        </p:tgtEl>
-                                        <p:attrNameLst>
-                                          <p:attrName>style.visibility</p:attrName>
-                                        </p:attrNameLst>
-                                      </p:cBhvr>
-                                      <p:to>
-                                        <p:strVal val="visible"/>
-                                      </p:to>
-                                    </p:set>
-                                  </p:childTnLst>
-                                </p:cTn>
-                              </p:par>
-                            </p:childTnLst>
-                          </p:cTn>
-                        </p:par>
-                      </p:childTnLst>
-                    </p:cTn>
-                  </p:par>
-                  <p:par>
-                    <p:cTn id="15" fill="hold">
-                      <p:stCondLst>
-                        <p:cond delay="indefinite"/>
-                      </p:stCondLst>
-                      <p:childTnLst>
-                        <p:par>
-                          <p:cTn id="16" fill="hold">
-                            <p:stCondLst>
-                              <p:cond delay="0"/>
-                            </p:stCondLst>
-                            <p:childTnLst>
-                              <p:par>
-                                <p:cTn id="17" presetID="1" presetClass="entr" presetSubtype="0" fill="hold" grpId="0" nodeType="clickEffect">
-                                  <p:stCondLst>
-                                    <p:cond delay="0"/>
-                                  </p:stCondLst>
-                                  <p:childTnLst>
-                                    <p:set>
-                                      <p:cBhvr>
-                                        <p:cTn id="18" dur="1" fill="hold">
-                                          <p:stCondLst>
-                                            <p:cond delay="0"/>
-                                          </p:stCondLst>
-                                        </p:cTn>
-                                        <p:tgtEl>
-                                          <p:spTgt spid="3">
-                                            <p:txEl>
-                                              <p:pRg st="6" end="6"/>
-                                            </p:txEl>
-                                          </p:spTgt>
-                                        </p:tgtEl>
-                                        <p:attrNameLst>
-                                          <p:attrName>style.visibility</p:attrName>
-                                        </p:attrNameLst>
-                                      </p:cBhvr>
-                                      <p:to>
-                                        <p:strVal val="visible"/>
-                                      </p:to>
-                                    </p:set>
-                                  </p:childTnLst>
-                                </p:cTn>
-                              </p:par>
-                              <p:par>
-                                <p:cTn id="19" presetID="1" presetClass="entr" presetSubtype="0" fill="hold" grpId="0" nodeType="withEffect">
-                                  <p:stCondLst>
-                                    <p:cond delay="0"/>
-                                  </p:stCondLst>
-                                  <p:childTnLst>
-                                    <p:set>
-                                      <p:cBhvr>
-                                        <p:cTn id="20" dur="1" fill="hold">
-                                          <p:stCondLst>
-                                            <p:cond delay="0"/>
-                                          </p:stCondLst>
-                                        </p:cTn>
-                                        <p:tgtEl>
-                                          <p:spTgt spid="3">
-                                            <p:txEl>
-                                              <p:pRg st="7" end="7"/>
-                                            </p:txEl>
-                                          </p:spTgt>
-                                        </p:tgtEl>
-                                        <p:attrNameLst>
-                                          <p:attrName>style.visibility</p:attrName>
-                                        </p:attrNameLst>
-                                      </p:cBhvr>
-                                      <p:to>
-                                        <p:strVal val="visible"/>
-                                      </p:to>
-                                    </p:set>
-                                  </p:childTnLst>
-                                </p:cTn>
-                              </p:par>
-                            </p:childTnLst>
-                          </p:cTn>
-                        </p:par>
-                      </p:childTnLst>
-                    </p:cTn>
-                  </p:par>
-                </p:childTnLst>
-              </p:cTn>
-              <p:prevCondLst>
-                <p:cond evt="onPrev" delay="0">
-                  <p:tgtEl>
-                    <p:sldTgt/>
-                  </p:tgtEl>
-                </p:cond>
-              </p:prevCondLst>
-              <p:nextCondLst>
-                <p:cond evt="onNext" delay="0">
-                  <p:tgtEl>
-                    <p:sldTgt/>
-                  </p:tgtEl>
-                </p:cond>
-              </p:nextCondLst>
-            </p:seq>
-          </p:childTnLst>
-        </p:cTn>
-      </p:par>
-    </p:tnLst>
-    <p:bldLst>
-      <p:bldP spid="3" grpId="0" build="p"/>
     </p:bldLst>
   </p:timing>
 </p:sld>

</xml_diff>